<commit_message>
actualizacion de sesion especial
</commit_message>
<xml_diff>
--- a/SeminarioProyectos1/Presentación SMNM.pptx
+++ b/SeminarioProyectos1/Presentación SMNM.pptx
@@ -1,6 +1,6 @@
 
 <file path=ppt/presentation.xml><?xml version="1.0" encoding="utf-8"?>
-<p:presentation xmlns:a="http://schemas.openxmlformats.org/drawingml/2006/main" xmlns:r="http://schemas.openxmlformats.org/officeDocument/2006/relationships" xmlns:p="http://schemas.openxmlformats.org/presentationml/2006/main" strictFirstAndLastChars="0" embedTrueTypeFonts="1" saveSubsetFonts="1" autoCompressPictures="0">
+<p:presentation xmlns:a="http://schemas.openxmlformats.org/drawingml/2006/main" xmlns:r="http://schemas.openxmlformats.org/officeDocument/2006/relationships" xmlns:p="http://schemas.openxmlformats.org/presentationml/2006/main" strictFirstAndLastChars="0" embedTrueTypeFonts="1" autoCompressPictures="0">
   <p:sldMasterIdLst>
     <p:sldMasterId id="2147483683" r:id="rId1"/>
   </p:sldMasterIdLst>
@@ -28,21 +28,21 @@
       <p:boldItalic r:id="rId14"/>
     </p:embeddedFont>
     <p:embeddedFont>
-      <p:font typeface="Gill Sans MT" panose="020B0502020104020203" pitchFamily="34" charset="0"/>
+      <p:font typeface="Gill Sans MT" panose="020B0502020104020203" pitchFamily="34" charset="77"/>
       <p:regular r:id="rId15"/>
       <p:bold r:id="rId16"/>
       <p:italic r:id="rId17"/>
       <p:boldItalic r:id="rId18"/>
     </p:embeddedFont>
     <p:embeddedFont>
-      <p:font typeface="Montserrat" panose="00000500000000000000" pitchFamily="2" charset="0"/>
+      <p:font typeface="Montserrat" pitchFamily="2" charset="77"/>
       <p:regular r:id="rId19"/>
       <p:bold r:id="rId20"/>
       <p:italic r:id="rId21"/>
       <p:boldItalic r:id="rId22"/>
     </p:embeddedFont>
     <p:embeddedFont>
-      <p:font typeface="Montserrat SemiBold" panose="00000700000000000000" pitchFamily="2" charset="0"/>
+      <p:font typeface="Montserrat SemiBold" pitchFamily="2" charset="77"/>
       <p:regular r:id="rId23"/>
       <p:bold r:id="rId24"/>
       <p:italic r:id="rId25"/>
@@ -149,7 +149,7 @@
       <p15:sldGuideLst xmlns:p15="http://schemas.microsoft.com/office/powerpoint/2012/main"/>
     </p:ext>
     <p:ext uri="http://customooxmlschemas.google.com/">
-      <go:slidesCustomData xmlns="" xmlns:mc="http://schemas.openxmlformats.org/markup-compatibility/2006" xmlns:mv="urn:schemas-microsoft-com:mac:vml" xmlns:c="http://schemas.openxmlformats.org/drawingml/2006/chart" xmlns:dgm="http://schemas.openxmlformats.org/drawingml/2006/diagram" xmlns:o="urn:schemas-microsoft-com:office:office" xmlns:v="urn:schemas-microsoft-com:vml" xmlns:pvml="urn:schemas-microsoft-com:office:powerpoint" xmlns:com="http://schemas.openxmlformats.org/drawingml/2006/compatibility" xmlns:p14="http://schemas.microsoft.com/office/powerpoint/2010/main" xmlns:p15="http://schemas.microsoft.com/office/powerpoint/2012/main" xmlns:ahyp="http://schemas.microsoft.com/office/drawing/2018/hyperlinkcolor" xmlns:go="http://customooxmlschemas.google.com/" r:id="rId28" roundtripDataSignature="AMtx7mhsYcODDan9HmJtaWqDDE5keU7a3g=="/>
+      <go:slidesCustomData xmlns:go="http://customooxmlschemas.google.com/" xmlns:ahyp="http://schemas.microsoft.com/office/drawing/2018/hyperlinkcolor" xmlns:p15="http://schemas.microsoft.com/office/powerpoint/2012/main" xmlns:p14="http://schemas.microsoft.com/office/powerpoint/2010/main" xmlns:com="http://schemas.openxmlformats.org/drawingml/2006/compatibility" xmlns:pvml="urn:schemas-microsoft-com:office:powerpoint" xmlns:v="urn:schemas-microsoft-com:vml" xmlns:o="urn:schemas-microsoft-com:office:office" xmlns:dgm="http://schemas.openxmlformats.org/drawingml/2006/diagram" xmlns:c="http://schemas.openxmlformats.org/drawingml/2006/chart" xmlns:mv="urn:schemas-microsoft-com:mac:vml" xmlns:mc="http://schemas.openxmlformats.org/markup-compatibility/2006" xmlns="" r:id="rId28" roundtripDataSignature="AMtx7mhsYcODDan9HmJtaWqDDE5keU7a3g=="/>
     </p:ext>
   </p:extLst>
 </p:presentation>
@@ -1359,7 +1359,7 @@
                 <a:cs typeface="Calibri"/>
                 <a:sym typeface="Calibri"/>
               </a:rPr>
-              <a:t>‹Nº›</a:t>
+              <a:t>‹#›</a:t>
             </a:fld>
             <a:endParaRPr sz="1200" b="0" i="0" u="none" strike="noStrike" cap="none">
               <a:solidFill>
@@ -2502,7 +2502,7 @@
             </a:pPr>
             <a:fld id="{00000000-1234-1234-1234-123412341234}" type="slidenum">
               <a:rPr lang="es-MX" smtClean="0"/>
-              <a:t>‹Nº›</a:t>
+              <a:t>‹#›</a:t>
             </a:fld>
             <a:endParaRPr lang="es-MX"/>
           </a:p>
@@ -2739,7 +2739,7 @@
             </a:pPr>
             <a:fld id="{00000000-1234-1234-1234-123412341234}" type="slidenum">
               <a:rPr lang="es-MX" smtClean="0"/>
-              <a:t>‹Nº›</a:t>
+              <a:t>‹#›</a:t>
             </a:fld>
             <a:endParaRPr lang="es-MX"/>
           </a:p>
@@ -2929,7 +2929,7 @@
             </a:pPr>
             <a:fld id="{00000000-1234-1234-1234-123412341234}" type="slidenum">
               <a:rPr lang="es-MX" smtClean="0"/>
-              <a:t>‹Nº›</a:t>
+              <a:t>‹#›</a:t>
             </a:fld>
             <a:endParaRPr lang="es-MX"/>
           </a:p>
@@ -4004,7 +4004,7 @@
             </a:pPr>
             <a:fld id="{00000000-1234-1234-1234-123412341234}" type="slidenum">
               <a:rPr lang="es-MX"/>
-              <a:t>‹Nº›</a:t>
+              <a:t>‹#›</a:t>
             </a:fld>
             <a:endParaRPr/>
           </a:p>
@@ -4179,7 +4179,7 @@
             </a:pPr>
             <a:fld id="{00000000-1234-1234-1234-123412341234}" type="slidenum">
               <a:rPr lang="es-MX" smtClean="0"/>
-              <a:t>‹Nº›</a:t>
+              <a:t>‹#›</a:t>
             </a:fld>
             <a:endParaRPr lang="es-MX"/>
           </a:p>
@@ -4464,7 +4464,7 @@
             </a:pPr>
             <a:fld id="{00000000-1234-1234-1234-123412341234}" type="slidenum">
               <a:rPr lang="es-MX" smtClean="0"/>
-              <a:t>‹Nº›</a:t>
+              <a:t>‹#›</a:t>
             </a:fld>
             <a:endParaRPr lang="es-MX"/>
           </a:p>
@@ -4737,7 +4737,7 @@
             </a:pPr>
             <a:fld id="{00000000-1234-1234-1234-123412341234}" type="slidenum">
               <a:rPr lang="es-MX" smtClean="0"/>
-              <a:t>‹Nº›</a:t>
+              <a:t>‹#›</a:t>
             </a:fld>
             <a:endParaRPr lang="es-MX"/>
           </a:p>
@@ -5190,7 +5190,7 @@
             </a:pPr>
             <a:fld id="{00000000-1234-1234-1234-123412341234}" type="slidenum">
               <a:rPr lang="es-MX" smtClean="0"/>
-              <a:t>‹Nº›</a:t>
+              <a:t>‹#›</a:t>
             </a:fld>
             <a:endParaRPr lang="es-MX"/>
           </a:p>
@@ -5344,7 +5344,7 @@
             </a:pPr>
             <a:fld id="{00000000-1234-1234-1234-123412341234}" type="slidenum">
               <a:rPr lang="es-MX" smtClean="0"/>
-              <a:t>‹Nº›</a:t>
+              <a:t>‹#›</a:t>
             </a:fld>
             <a:endParaRPr lang="es-MX"/>
           </a:p>
@@ -5445,7 +5445,7 @@
             </a:pPr>
             <a:fld id="{00000000-1234-1234-1234-123412341234}" type="slidenum">
               <a:rPr lang="es-MX" smtClean="0"/>
-              <a:t>‹Nº›</a:t>
+              <a:t>‹#›</a:t>
             </a:fld>
             <a:endParaRPr lang="es-MX"/>
           </a:p>
@@ -5704,7 +5704,7 @@
             </a:pPr>
             <a:fld id="{00000000-1234-1234-1234-123412341234}" type="slidenum">
               <a:rPr lang="es-MX" smtClean="0"/>
-              <a:t>‹Nº›</a:t>
+              <a:t>‹#›</a:t>
             </a:fld>
             <a:endParaRPr lang="es-MX"/>
           </a:p>
@@ -6160,7 +6160,7 @@
             </a:pPr>
             <a:fld id="{00000000-1234-1234-1234-123412341234}" type="slidenum">
               <a:rPr lang="es-MX" smtClean="0"/>
-              <a:t>‹Nº›</a:t>
+              <a:t>‹#›</a:t>
             </a:fld>
             <a:endParaRPr lang="es-MX"/>
           </a:p>
@@ -6559,7 +6559,7 @@
             </a:pPr>
             <a:fld id="{00000000-1234-1234-1234-123412341234}" type="slidenum">
               <a:rPr lang="es-MX" smtClean="0"/>
-              <a:t>‹Nº›</a:t>
+              <a:t>‹#›</a:t>
             </a:fld>
             <a:endParaRPr lang="es-MX"/>
           </a:p>
@@ -7105,7 +7105,7 @@
                 <a:cs typeface="Montserrat"/>
                 <a:sym typeface="Montserrat"/>
               </a:rPr>
-              <a:t>Licenciatura de Matemáticas Aplicadas en la </a:t>
+              <a:t>Licenciatura de Matemáticas Aplicadas </a:t>
             </a:r>
             <a:r>
               <a:rPr lang="es-MX" sz="1600" b="0" i="0" u="none" strike="noStrike" cap="none" dirty="0">
@@ -7157,7 +7157,7 @@
                 <a:cs typeface="Montserrat"/>
                 <a:sym typeface="Montserrat"/>
               </a:rPr>
-              <a:t>Maestría en Estadística en la </a:t>
+              <a:t>Maestría en Estadística                          </a:t>
             </a:r>
             <a:r>
               <a:rPr lang="es-MX" sz="1600" b="0" i="0" u="none" strike="noStrike" cap="none" dirty="0">
@@ -7200,7 +7200,7 @@
                 <a:cs typeface="Montserrat"/>
                 <a:sym typeface="Montserrat"/>
               </a:rPr>
-              <a:t>Doctorado en Ciencias en Ciencia de Datos (</a:t>
+              <a:t>Doctorado en Ciencias en Ciencia de Datos </a:t>
             </a:r>
             <a:r>
               <a:rPr lang="es-MX" sz="1600" dirty="0">
@@ -7211,18 +7211,6 @@
                 <a:sym typeface="Montserrat"/>
               </a:rPr>
               <a:t>INFOTEC</a:t>
-            </a:r>
-            <a:r>
-              <a:rPr lang="es-MX" sz="1600" b="0" i="0" u="none" strike="noStrike" cap="none" dirty="0">
-                <a:solidFill>
-                  <a:srgbClr val="888888"/>
-                </a:solidFill>
-                <a:latin typeface="Montserrat"/>
-                <a:ea typeface="Montserrat"/>
-                <a:cs typeface="Montserrat"/>
-                <a:sym typeface="Montserrat"/>
-              </a:rPr>
-              <a:t>)</a:t>
             </a:r>
             <a:endParaRPr sz="1600" b="0" i="0" u="none" strike="noStrike" cap="none" dirty="0">
               <a:solidFill>
@@ -7314,7 +7302,7 @@
                 <a:cs typeface="Montserrat"/>
                 <a:sym typeface="Montserrat"/>
               </a:rPr>
-              <a:t> desde enero de 1996. Desde marzo de 1997 hasta mayo de 2019 en la </a:t>
+              <a:t> desde enero de 1996. Desde marzo de 1998 en la </a:t>
             </a:r>
             <a:r>
               <a:rPr lang="es-MX" sz="1600" b="0" i="0" u="none" strike="noStrike" cap="none" dirty="0">
@@ -7328,123 +7316,6 @@
               </a:rPr>
               <a:t>Unidad Aguascalientes. </a:t>
             </a:r>
-          </a:p>
-          <a:p>
-            <a:pPr marL="40004" marR="0" lvl="0" indent="0" algn="l" rtl="0">
-              <a:lnSpc>
-                <a:spcPct val="100000"/>
-              </a:lnSpc>
-              <a:spcBef>
-                <a:spcPts val="1000"/>
-              </a:spcBef>
-              <a:spcAft>
-                <a:spcPts val="0"/>
-              </a:spcAft>
-              <a:buClr>
-                <a:srgbClr val="888888"/>
-              </a:buClr>
-              <a:buSzPct val="108107"/>
-              <a:buFont typeface="Arial"/>
-              <a:buNone/>
-            </a:pPr>
-            <a:r>
-              <a:rPr lang="es-MX" sz="1600" b="0" i="0" u="none" strike="noStrike" cap="none" dirty="0">
-                <a:solidFill>
-                  <a:srgbClr val="888888"/>
-                </a:solidFill>
-                <a:latin typeface="Montserrat"/>
-                <a:ea typeface="Montserrat"/>
-                <a:cs typeface="Montserrat"/>
-                <a:sym typeface="Montserrat"/>
-              </a:rPr>
-              <a:t>De mayo de 2019 </a:t>
-            </a:r>
-            <a:r>
-              <a:rPr lang="es-MX" sz="1600" dirty="0">
-                <a:solidFill>
-                  <a:srgbClr val="888888"/>
-                </a:solidFill>
-                <a:latin typeface="Montserrat"/>
-                <a:ea typeface="Montserrat"/>
-                <a:cs typeface="Montserrat"/>
-                <a:sym typeface="Montserrat"/>
-              </a:rPr>
-              <a:t>a</a:t>
-            </a:r>
-            <a:r>
-              <a:rPr lang="es-MX" sz="1600" b="0" i="0" u="none" strike="noStrike" cap="none" dirty="0">
-                <a:solidFill>
-                  <a:srgbClr val="888888"/>
-                </a:solidFill>
-                <a:latin typeface="Montserrat"/>
-                <a:ea typeface="Montserrat"/>
-                <a:cs typeface="Montserrat"/>
-                <a:sym typeface="Montserrat"/>
-              </a:rPr>
-              <a:t> julio de 2022 en la </a:t>
-            </a:r>
-            <a:r>
-              <a:rPr lang="es-MX" sz="1600" b="0" i="0" u="none" strike="noStrike" cap="none" dirty="0">
-                <a:solidFill>
-                  <a:srgbClr val="833C0B"/>
-                </a:solidFill>
-                <a:latin typeface="Montserrat"/>
-                <a:ea typeface="Montserrat"/>
-                <a:cs typeface="Montserrat"/>
-                <a:sym typeface="Montserrat"/>
-              </a:rPr>
-              <a:t>Unidad Zacatecas. </a:t>
-            </a:r>
-          </a:p>
-          <a:p>
-            <a:pPr marL="40004" marR="0" lvl="0" indent="0" algn="l" rtl="0">
-              <a:lnSpc>
-                <a:spcPct val="100000"/>
-              </a:lnSpc>
-              <a:spcBef>
-                <a:spcPts val="1000"/>
-              </a:spcBef>
-              <a:spcAft>
-                <a:spcPts val="0"/>
-              </a:spcAft>
-              <a:buClr>
-                <a:srgbClr val="888888"/>
-              </a:buClr>
-              <a:buSzPct val="108107"/>
-              <a:buFont typeface="Arial"/>
-              <a:buNone/>
-            </a:pPr>
-            <a:r>
-              <a:rPr lang="es-MX" sz="1600" dirty="0">
-                <a:solidFill>
-                  <a:srgbClr val="888888"/>
-                </a:solidFill>
-                <a:latin typeface="Montserrat"/>
-                <a:sym typeface="Montserrat"/>
-              </a:rPr>
-              <a:t>Actualmente en</a:t>
-            </a:r>
-            <a:r>
-              <a:rPr lang="es-MX" sz="1600" b="0" i="0" u="none" strike="noStrike" cap="none" dirty="0">
-                <a:solidFill>
-                  <a:srgbClr val="833C0B"/>
-                </a:solidFill>
-                <a:latin typeface="Montserrat"/>
-                <a:ea typeface="Montserrat"/>
-                <a:cs typeface="Montserrat"/>
-                <a:sym typeface="Montserrat"/>
-              </a:rPr>
-              <a:t> Aguascalientes </a:t>
-            </a:r>
-            <a:endParaRPr sz="1600" b="0" i="0" u="none" strike="noStrike" cap="none" dirty="0">
-              <a:solidFill>
-                <a:srgbClr val="000000"/>
-              </a:solidFill>
-              <a:latin typeface="Arial"/>
-              <a:ea typeface="Arial"/>
-              <a:cs typeface="Arial"/>
-              <a:sym typeface="Arial"/>
-            </a:endParaRPr>
           </a:p>
         </p:txBody>
       </p:sp>
@@ -8182,7 +8053,7 @@
               <a:buNone/>
             </a:pPr>
             <a:r>
-              <a:rPr lang="es-MX" sz="3300" b="1" i="0" u="none" strike="noStrike" cap="none">
+              <a:rPr lang="es-MX" sz="3300" b="1" i="0" u="none" strike="noStrike" cap="none" dirty="0">
                 <a:solidFill>
                   <a:srgbClr val="BC945A"/>
                 </a:solidFill>
@@ -8193,7 +8064,7 @@
               </a:rPr>
               <a:t>Sergio M. Nava Muñoz</a:t>
             </a:r>
-            <a:endParaRPr sz="1400" b="0" i="0" u="none" strike="noStrike" cap="none">
+            <a:endParaRPr sz="1400" b="0" i="0" u="none" strike="noStrike" cap="none" dirty="0">
               <a:solidFill>
                 <a:srgbClr val="000000"/>
               </a:solidFill>
@@ -8446,7 +8317,7 @@
                 <a:latin typeface="Montserrat" panose="00000500000000000000" pitchFamily="2" charset="0"/>
                 <a:sym typeface="Montserrat"/>
               </a:rPr>
-              <a:t>Actualmente: </a:t>
+              <a:t>DCCD: </a:t>
             </a:r>
             <a:r>
               <a:rPr lang="es-MX" dirty="0">
@@ -8581,11 +8452,18 @@
         </p:nvSpPr>
         <p:spPr/>
         <p:txBody>
-          <a:bodyPr/>
+          <a:bodyPr>
+            <a:normAutofit/>
+          </a:bodyPr>
           <a:lstStyle/>
           <a:p>
             <a:r>
-              <a:rPr lang="es-MX" dirty="0"/>
+              <a:rPr lang="es-MX" b="1" cap="none" dirty="0">
+                <a:solidFill>
+                  <a:srgbClr val="BC945A"/>
+                </a:solidFill>
+                <a:latin typeface="Montserrat SemiBold"/>
+              </a:rPr>
               <a:t>¿Por qué imputar datos en imágenes?</a:t>
             </a:r>
           </a:p>
@@ -8625,8 +8503,31 @@
               </a:lnSpc>
             </a:pPr>
             <a:r>
-              <a:rPr lang="es-MX" dirty="0"/>
-              <a:t>En muchas aplicaciones, las imágenes pueden presentar datos faltantes o corruptos, por ejemplo:</a:t>
+              <a:rPr lang="es-MX" sz="1800" dirty="0">
+                <a:solidFill>
+                  <a:srgbClr val="888888"/>
+                </a:solidFill>
+                <a:latin typeface="Montserrat" panose="00000500000000000000" pitchFamily="2" charset="0"/>
+              </a:rPr>
+              <a:t>En muchas aplicaciones, las imágenes pueden presentar </a:t>
+            </a:r>
+            <a:r>
+              <a:rPr lang="es-MX" sz="1800" dirty="0">
+                <a:solidFill>
+                  <a:srgbClr val="833C0B"/>
+                </a:solidFill>
+                <a:latin typeface="Montserrat" panose="00000500000000000000" pitchFamily="2" charset="0"/>
+              </a:rPr>
+              <a:t>datos faltantes</a:t>
+            </a:r>
+            <a:r>
+              <a:rPr lang="es-MX" sz="1800" dirty="0">
+                <a:solidFill>
+                  <a:srgbClr val="888888"/>
+                </a:solidFill>
+                <a:latin typeface="Montserrat" panose="00000500000000000000" pitchFamily="2" charset="0"/>
+              </a:rPr>
+              <a:t> o corruptos, por ejemplo:</a:t>
             </a:r>
           </a:p>
           <a:p>
@@ -8636,7 +8537,12 @@
               </a:lnSpc>
             </a:pPr>
             <a:r>
-              <a:rPr lang="es-MX" sz="1800" dirty="0"/>
+              <a:rPr lang="es-MX" sz="1800" dirty="0">
+                <a:solidFill>
+                  <a:srgbClr val="888888"/>
+                </a:solidFill>
+                <a:latin typeface="Montserrat" panose="00000500000000000000" pitchFamily="2" charset="0"/>
+              </a:rPr>
               <a:t>Sensores defectuosos en imágenes satelitales </a:t>
             </a:r>
           </a:p>
@@ -8647,8 +8553,29 @@
               </a:lnSpc>
             </a:pPr>
             <a:r>
-              <a:rPr lang="es-MX" sz="1800" dirty="0"/>
-              <a:t>Pérdida de información en transmisión de datos </a:t>
+              <a:rPr lang="es-MX" sz="1800" dirty="0">
+                <a:solidFill>
+                  <a:srgbClr val="888888"/>
+                </a:solidFill>
+                <a:latin typeface="Montserrat" panose="00000500000000000000" pitchFamily="2" charset="0"/>
+              </a:rPr>
+              <a:t>Pérdida de información en transmisión de datos  </a:t>
+            </a:r>
+          </a:p>
+          <a:p>
+            <a:pPr>
+              <a:lnSpc>
+                <a:spcPct val="100000"/>
+              </a:lnSpc>
+            </a:pPr>
+            <a:r>
+              <a:rPr lang="es-MX" sz="1800" dirty="0">
+                <a:solidFill>
+                  <a:srgbClr val="888888"/>
+                </a:solidFill>
+                <a:latin typeface="Montserrat" panose="00000500000000000000" pitchFamily="2" charset="0"/>
+              </a:rPr>
+              <a:t>La imputación de imágenes permite:</a:t>
             </a:r>
           </a:p>
           <a:p>
@@ -8658,19 +8585,29 @@
               </a:lnSpc>
             </a:pPr>
             <a:r>
-              <a:rPr lang="es-MX" sz="1800" dirty="0"/>
-              <a:t>Ocultamiento de datos por privacidad o seguridad </a:t>
-            </a:r>
-          </a:p>
-          <a:p>
-            <a:pPr>
+              <a:rPr lang="es-MX" sz="1800" dirty="0">
+                <a:solidFill>
+                  <a:srgbClr val="888888"/>
+                </a:solidFill>
+                <a:latin typeface="Montserrat" panose="00000500000000000000" pitchFamily="2" charset="0"/>
+              </a:rPr>
+              <a:t>Recuperar información útil </a:t>
+            </a:r>
+          </a:p>
+          <a:p>
+            <a:pPr lvl="1">
               <a:lnSpc>
                 <a:spcPct val="100000"/>
               </a:lnSpc>
             </a:pPr>
             <a:r>
-              <a:rPr lang="es-MX" dirty="0"/>
-              <a:t>La imputación de imágenes permite:</a:t>
+              <a:rPr lang="es-MX" sz="1800" dirty="0">
+                <a:solidFill>
+                  <a:srgbClr val="888888"/>
+                </a:solidFill>
+                <a:latin typeface="Montserrat" panose="00000500000000000000" pitchFamily="2" charset="0"/>
+              </a:rPr>
+              <a:t>Mejorar el desempeño de modelos de visión por computadora</a:t>
             </a:r>
           </a:p>
           <a:p>
@@ -8680,29 +8617,12 @@
               </a:lnSpc>
             </a:pPr>
             <a:r>
-              <a:rPr lang="es-MX" sz="1800" dirty="0"/>
-              <a:t>Recuperar información útil </a:t>
-            </a:r>
-          </a:p>
-          <a:p>
-            <a:pPr lvl="1">
-              <a:lnSpc>
-                <a:spcPct val="100000"/>
-              </a:lnSpc>
-            </a:pPr>
-            <a:r>
-              <a:rPr lang="es-MX" sz="1800" dirty="0"/>
-              <a:t>Mejorar el desempeño de modelos de visión por computadora</a:t>
-            </a:r>
-          </a:p>
-          <a:p>
-            <a:pPr lvl="1">
-              <a:lnSpc>
-                <a:spcPct val="100000"/>
-              </a:lnSpc>
-            </a:pPr>
-            <a:r>
-              <a:rPr lang="es-MX" sz="1800" dirty="0"/>
+              <a:rPr lang="es-MX" sz="1800" dirty="0">
+                <a:solidFill>
+                  <a:srgbClr val="888888"/>
+                </a:solidFill>
+                <a:latin typeface="Montserrat" panose="00000500000000000000" pitchFamily="2" charset="0"/>
+              </a:rPr>
               <a:t>Facilitar análisis posteriores (clasificación, segmentación, etc.)</a:t>
             </a:r>
           </a:p>
@@ -8730,8 +8650,8 @@
         </p:blipFill>
         <p:spPr>
           <a:xfrm>
-            <a:off x="2731299" y="4956312"/>
-            <a:ext cx="3869111" cy="1901687"/>
+            <a:off x="2476073" y="4830868"/>
+            <a:ext cx="4124338" cy="2027132"/>
           </a:xfrm>
           <a:prstGeom prst="rect">
             <a:avLst/>
@@ -8786,11 +8706,18 @@
         </p:nvSpPr>
         <p:spPr/>
         <p:txBody>
-          <a:bodyPr/>
+          <a:bodyPr>
+            <a:normAutofit/>
+          </a:bodyPr>
           <a:lstStyle/>
           <a:p>
             <a:r>
-              <a:rPr lang="es-MX" dirty="0"/>
+              <a:rPr lang="es-MX" b="1" cap="none" dirty="0">
+                <a:solidFill>
+                  <a:srgbClr val="BC945A"/>
+                </a:solidFill>
+                <a:latin typeface="Montserrat SemiBold"/>
+              </a:rPr>
               <a:t>¿Qué se ha hecho y qué falta por explorar?</a:t>
             </a:r>
           </a:p>
@@ -8814,8 +8741,8 @@
         </p:nvSpPr>
         <p:spPr bwMode="auto">
           <a:xfrm>
-            <a:off x="1443491" y="1853755"/>
-            <a:ext cx="5922840" cy="4278966"/>
+            <a:off x="1443490" y="1853755"/>
+            <a:ext cx="7073785" cy="4278966"/>
           </a:xfrm>
           <a:prstGeom prst="rect">
             <a:avLst/>
@@ -8823,7 +8750,7 @@
         </p:spPr>
         <p:txBody>
           <a:bodyPr vert="horz" lIns="91440" tIns="45720" rIns="91440" bIns="45720" rtlCol="0" anchor="t">
-            <a:normAutofit lnSpcReduction="10000"/>
+            <a:noAutofit/>
           </a:bodyPr>
           <a:lstStyle/>
           <a:p>
@@ -8833,7 +8760,12 @@
               </a:lnSpc>
             </a:pPr>
             <a:r>
-              <a:rPr lang="es-MX" altLang="es-MX" dirty="0"/>
+              <a:rPr lang="es-MX" altLang="es-MX" sz="1700" dirty="0">
+                <a:solidFill>
+                  <a:srgbClr val="888888"/>
+                </a:solidFill>
+                <a:latin typeface="Montserrat" panose="00000500000000000000" pitchFamily="2" charset="0"/>
+              </a:rPr>
               <a:t>Enfoques tradicionales: </a:t>
             </a:r>
           </a:p>
@@ -8844,7 +8776,12 @@
               </a:lnSpc>
             </a:pPr>
             <a:r>
-              <a:rPr lang="es-MX" altLang="es-MX" sz="1800" dirty="0"/>
+              <a:rPr lang="es-MX" altLang="es-MX" sz="1700" dirty="0">
+                <a:solidFill>
+                  <a:srgbClr val="888888"/>
+                </a:solidFill>
+                <a:latin typeface="Montserrat" panose="00000500000000000000" pitchFamily="2" charset="0"/>
+              </a:rPr>
               <a:t>Interpolación espacial </a:t>
             </a:r>
           </a:p>
@@ -8855,24 +8792,13 @@
               </a:lnSpc>
             </a:pPr>
             <a:r>
-              <a:rPr lang="es-MX" altLang="es-MX" sz="1800" dirty="0"/>
-              <a:t>K-</a:t>
-            </a:r>
-            <a:r>
-              <a:rPr lang="es-MX" altLang="es-MX" sz="1800" dirty="0" err="1"/>
-              <a:t>Nearest</a:t>
-            </a:r>
-            <a:r>
-              <a:rPr lang="es-MX" altLang="es-MX" sz="1800" dirty="0"/>
-              <a:t> </a:t>
-            </a:r>
-            <a:r>
-              <a:rPr lang="es-MX" altLang="es-MX" sz="1800" dirty="0" err="1"/>
-              <a:t>Neighbors</a:t>
-            </a:r>
-            <a:r>
-              <a:rPr lang="es-MX" altLang="es-MX" sz="1800" dirty="0"/>
-              <a:t> (KNN) </a:t>
+              <a:rPr lang="es-MX" altLang="es-MX" sz="1700" dirty="0">
+                <a:solidFill>
+                  <a:srgbClr val="888888"/>
+                </a:solidFill>
+                <a:latin typeface="Montserrat" panose="00000500000000000000" pitchFamily="2" charset="0"/>
+              </a:rPr>
+              <a:t>K-Nearest Neighbors (KNN) </a:t>
             </a:r>
           </a:p>
           <a:p>
@@ -8882,7 +8808,12 @@
               </a:lnSpc>
             </a:pPr>
             <a:r>
-              <a:rPr lang="es-MX" altLang="es-MX" sz="1800" dirty="0"/>
+              <a:rPr lang="es-MX" altLang="es-MX" sz="1700" dirty="0">
+                <a:solidFill>
+                  <a:srgbClr val="888888"/>
+                </a:solidFill>
+                <a:latin typeface="Montserrat" panose="00000500000000000000" pitchFamily="2" charset="0"/>
+              </a:rPr>
               <a:t>Modelos estadísticos clásicos </a:t>
             </a:r>
           </a:p>
@@ -8893,7 +8824,12 @@
               </a:lnSpc>
             </a:pPr>
             <a:r>
-              <a:rPr lang="es-MX" altLang="es-MX" dirty="0"/>
+              <a:rPr lang="es-MX" altLang="es-MX" sz="1700" dirty="0">
+                <a:solidFill>
+                  <a:srgbClr val="888888"/>
+                </a:solidFill>
+                <a:latin typeface="Montserrat" panose="00000500000000000000" pitchFamily="2" charset="0"/>
+              </a:rPr>
               <a:t>Enfoques modernos: </a:t>
             </a:r>
           </a:p>
@@ -8904,16 +8840,13 @@
               </a:lnSpc>
             </a:pPr>
             <a:r>
-              <a:rPr lang="es-MX" altLang="es-MX" sz="1800" dirty="0"/>
-              <a:t>Redes neuronales convolucionales (</a:t>
-            </a:r>
-            <a:r>
-              <a:rPr lang="es-MX" altLang="es-MX" sz="1800" dirty="0" err="1"/>
-              <a:t>CNNs</a:t>
-            </a:r>
-            <a:r>
-              <a:rPr lang="es-MX" altLang="es-MX" sz="1800" dirty="0"/>
-              <a:t>) </a:t>
+              <a:rPr lang="es-MX" altLang="es-MX" sz="1700" dirty="0">
+                <a:solidFill>
+                  <a:srgbClr val="888888"/>
+                </a:solidFill>
+                <a:latin typeface="Montserrat" panose="00000500000000000000" pitchFamily="2" charset="0"/>
+              </a:rPr>
+              <a:t>Redes neuronales convolucionales (CNNs) </a:t>
             </a:r>
           </a:p>
           <a:p>
@@ -8923,12 +8856,13 @@
               </a:lnSpc>
             </a:pPr>
             <a:r>
-              <a:rPr lang="es-MX" altLang="es-MX" sz="1800" dirty="0" err="1"/>
-              <a:t>Autoencoders</a:t>
-            </a:r>
-            <a:r>
-              <a:rPr lang="es-MX" altLang="es-MX" sz="1800" dirty="0"/>
-              <a:t> </a:t>
+              <a:rPr lang="es-MX" altLang="es-MX" sz="1700" dirty="0">
+                <a:solidFill>
+                  <a:srgbClr val="888888"/>
+                </a:solidFill>
+                <a:latin typeface="Montserrat" panose="00000500000000000000" pitchFamily="2" charset="0"/>
+              </a:rPr>
+              <a:t>Autoencoders </a:t>
             </a:r>
           </a:p>
           <a:p>
@@ -8938,32 +8872,13 @@
               </a:lnSpc>
             </a:pPr>
             <a:r>
-              <a:rPr lang="es-MX" altLang="es-MX" sz="1800" dirty="0"/>
-              <a:t>Modelos generativos (</a:t>
-            </a:r>
-            <a:r>
-              <a:rPr lang="es-MX" altLang="es-MX" sz="1800" dirty="0" err="1"/>
-              <a:t>GANs</a:t>
-            </a:r>
-            <a:r>
-              <a:rPr lang="es-MX" altLang="es-MX" sz="1800" dirty="0"/>
-              <a:t>, </a:t>
-            </a:r>
-            <a:r>
-              <a:rPr lang="es-MX" altLang="es-MX" sz="1800" dirty="0" err="1"/>
-              <a:t>Diffusion</a:t>
-            </a:r>
-            <a:r>
-              <a:rPr lang="es-MX" altLang="es-MX" sz="1800" dirty="0"/>
-              <a:t> </a:t>
-            </a:r>
-            <a:r>
-              <a:rPr lang="es-MX" altLang="es-MX" sz="1800" dirty="0" err="1"/>
-              <a:t>Models</a:t>
-            </a:r>
-            <a:r>
-              <a:rPr lang="es-MX" altLang="es-MX" sz="1800" dirty="0"/>
-              <a:t>) </a:t>
+              <a:rPr lang="es-MX" altLang="es-MX" sz="1700" dirty="0">
+                <a:solidFill>
+                  <a:srgbClr val="888888"/>
+                </a:solidFill>
+                <a:latin typeface="Montserrat" panose="00000500000000000000" pitchFamily="2" charset="0"/>
+              </a:rPr>
+              <a:t>Modelos generativos (GANs, Diffusion Models) </a:t>
             </a:r>
           </a:p>
           <a:p>
@@ -8973,7 +8888,12 @@
               </a:lnSpc>
             </a:pPr>
             <a:r>
-              <a:rPr lang="es-MX" altLang="es-MX" dirty="0"/>
+              <a:rPr lang="es-MX" altLang="es-MX" sz="1700" dirty="0">
+                <a:solidFill>
+                  <a:srgbClr val="888888"/>
+                </a:solidFill>
+                <a:latin typeface="Montserrat" panose="00000500000000000000" pitchFamily="2" charset="0"/>
+              </a:rPr>
               <a:t>Retos actuales: </a:t>
             </a:r>
           </a:p>
@@ -8984,7 +8904,12 @@
               </a:lnSpc>
             </a:pPr>
             <a:r>
-              <a:rPr lang="es-MX" altLang="es-MX" sz="1800" dirty="0"/>
+              <a:rPr lang="es-MX" altLang="es-MX" sz="1700" dirty="0">
+                <a:solidFill>
+                  <a:srgbClr val="888888"/>
+                </a:solidFill>
+                <a:latin typeface="Montserrat" panose="00000500000000000000" pitchFamily="2" charset="0"/>
+              </a:rPr>
               <a:t>Imputación precisa en áreas extensas o altamente corruptas </a:t>
             </a:r>
           </a:p>
@@ -8995,7 +8920,12 @@
               </a:lnSpc>
             </a:pPr>
             <a:r>
-              <a:rPr lang="es-MX" altLang="es-MX" sz="1800" dirty="0"/>
+              <a:rPr lang="es-MX" altLang="es-MX" sz="1700" dirty="0">
+                <a:solidFill>
+                  <a:srgbClr val="888888"/>
+                </a:solidFill>
+                <a:latin typeface="Montserrat" panose="00000500000000000000" pitchFamily="2" charset="0"/>
+              </a:rPr>
               <a:t>Preservar características estructurales </a:t>
             </a:r>
           </a:p>
@@ -9006,7 +8936,12 @@
               </a:lnSpc>
             </a:pPr>
             <a:r>
-              <a:rPr lang="es-MX" altLang="es-MX" sz="1800" dirty="0"/>
+              <a:rPr lang="es-MX" altLang="es-MX" sz="1700" dirty="0">
+                <a:solidFill>
+                  <a:srgbClr val="888888"/>
+                </a:solidFill>
+                <a:latin typeface="Montserrat" panose="00000500000000000000" pitchFamily="2" charset="0"/>
+              </a:rPr>
               <a:t>Balance entre precisión y costo computacional</a:t>
             </a:r>
           </a:p>
@@ -9060,14 +8995,35 @@
         </p:nvSpPr>
         <p:spPr/>
         <p:txBody>
-          <a:bodyPr/>
+          <a:bodyPr vert="horz" lIns="91440" tIns="45720" rIns="91440" bIns="45720" rtlCol="0" anchor="t">
+            <a:normAutofit/>
+          </a:bodyPr>
           <a:lstStyle/>
           <a:p>
             <a:r>
-              <a:rPr lang="fr-FR" dirty="0"/>
-              <a:t>Frey Faces (1965, 20 x 28)</a:t>
-            </a:r>
-            <a:endParaRPr lang="es-MX" dirty="0"/>
+              <a:rPr lang="fr-FR" b="1" cap="none" dirty="0">
+                <a:solidFill>
+                  <a:srgbClr val="BC945A"/>
+                </a:solidFill>
+                <a:latin typeface="Montserrat SemiBold"/>
+              </a:rPr>
+              <a:t>Frey Faces (1965, 20 x </a:t>
+            </a:r>
+            <a:r>
+              <a:rPr lang="fr-FR" b="1" cap="none">
+                <a:solidFill>
+                  <a:srgbClr val="BC945A"/>
+                </a:solidFill>
+                <a:latin typeface="Montserrat SemiBold"/>
+              </a:rPr>
+              <a:t>28)</a:t>
+            </a:r>
+            <a:endParaRPr lang="es-MX" b="1" cap="none" dirty="0">
+              <a:solidFill>
+                <a:srgbClr val="BC945A"/>
+              </a:solidFill>
+              <a:latin typeface="Montserrat SemiBold"/>
+            </a:endParaRPr>
           </a:p>
         </p:txBody>
       </p:sp>
@@ -9187,10 +9143,22 @@
           <a:lstStyle/>
           <a:p>
             <a:r>
-              <a:rPr lang="es-ES" dirty="0"/>
+              <a:rPr lang="es-ES" dirty="0">
+                <a:solidFill>
+                  <a:schemeClr val="bg2">
+                    <a:lumMod val="50000"/>
+                  </a:schemeClr>
+                </a:solidFill>
+              </a:rPr>
               <a:t>	0 Iteraciones				100 Iteraciones			10,000 iteraciones</a:t>
             </a:r>
-            <a:endParaRPr lang="es-MX" dirty="0"/>
+            <a:endParaRPr lang="es-MX" dirty="0">
+              <a:solidFill>
+                <a:schemeClr val="bg2">
+                  <a:lumMod val="50000"/>
+                </a:schemeClr>
+              </a:solidFill>
+            </a:endParaRPr>
           </a:p>
         </p:txBody>
       </p:sp>
@@ -9242,13 +9210,18 @@
         </p:nvSpPr>
         <p:spPr/>
         <p:txBody>
-          <a:bodyPr>
+          <a:bodyPr vert="horz" lIns="91440" tIns="45720" rIns="91440" bIns="45720" rtlCol="0" anchor="t">
             <a:normAutofit fontScale="90000"/>
           </a:bodyPr>
           <a:lstStyle/>
           <a:p>
             <a:r>
-              <a:rPr lang="es-MX" dirty="0"/>
+              <a:rPr lang="es-MX" b="1" cap="none" dirty="0">
+                <a:solidFill>
+                  <a:srgbClr val="BC945A"/>
+                </a:solidFill>
+                <a:latin typeface="Montserrat SemiBold"/>
+              </a:rPr>
               <a:t>Propuesta de Tesis: Imputación de Datos Faltantes en Imágenes</a:t>
             </a:r>
           </a:p>
@@ -9281,7 +9254,7 @@
         </p:spPr>
         <p:txBody>
           <a:bodyPr vert="horz" lIns="91440" tIns="45720" rIns="91440" bIns="45720" rtlCol="0" anchor="t">
-            <a:normAutofit lnSpcReduction="10000"/>
+            <a:noAutofit/>
           </a:bodyPr>
           <a:lstStyle/>
           <a:p>
@@ -9290,7 +9263,13 @@
                 <a:spcPct val="100000"/>
               </a:lnSpc>
             </a:pPr>
-            <a:endParaRPr lang="es-MX" altLang="es-MX" dirty="0"/>
+            <a:endParaRPr lang="es-MX" altLang="es-MX" sz="1700" dirty="0">
+              <a:solidFill>
+                <a:schemeClr val="bg2">
+                  <a:lumMod val="50000"/>
+                </a:schemeClr>
+              </a:solidFill>
+            </a:endParaRPr>
           </a:p>
           <a:p>
             <a:pPr>
@@ -9299,7 +9278,12 @@
               </a:lnSpc>
             </a:pPr>
             <a:r>
-              <a:rPr lang="es-MX" altLang="es-MX" dirty="0"/>
+              <a:rPr lang="es-MX" altLang="es-MX" sz="1700" dirty="0">
+                <a:solidFill>
+                  <a:srgbClr val="888888"/>
+                </a:solidFill>
+                <a:latin typeface="Montserrat" panose="00000500000000000000" pitchFamily="2" charset="0"/>
+              </a:rPr>
               <a:t>Objetivo general: </a:t>
             </a:r>
           </a:p>
@@ -9310,8 +9294,22 @@
               </a:lnSpc>
             </a:pPr>
             <a:r>
-              <a:rPr lang="es-MX" altLang="es-MX" sz="1800" dirty="0"/>
-              <a:t>Explorar, comparar y mejorar métodos de imputación en imágenes con datos faltantes. </a:t>
+              <a:rPr lang="es-MX" altLang="es-MX" sz="1700" dirty="0">
+                <a:solidFill>
+                  <a:srgbClr val="833C0B"/>
+                </a:solidFill>
+                <a:latin typeface="Montserrat" panose="00000500000000000000" pitchFamily="2" charset="0"/>
+              </a:rPr>
+              <a:t>Explorar, comparar y mejorar </a:t>
+            </a:r>
+            <a:r>
+              <a:rPr lang="es-MX" altLang="es-MX" sz="1700" dirty="0">
+                <a:solidFill>
+                  <a:srgbClr val="888888"/>
+                </a:solidFill>
+                <a:latin typeface="Montserrat" panose="00000500000000000000" pitchFamily="2" charset="0"/>
+              </a:rPr>
+              <a:t>métodos de imputación en imágenes con datos faltantes. </a:t>
             </a:r>
           </a:p>
           <a:p>
@@ -9321,7 +9319,12 @@
               </a:lnSpc>
             </a:pPr>
             <a:r>
-              <a:rPr lang="es-MX" altLang="es-MX" dirty="0"/>
+              <a:rPr lang="es-MX" altLang="es-MX" sz="1700" dirty="0">
+                <a:solidFill>
+                  <a:srgbClr val="888888"/>
+                </a:solidFill>
+                <a:latin typeface="Montserrat" panose="00000500000000000000" pitchFamily="2" charset="0"/>
+              </a:rPr>
               <a:t>Posibles líneas de trabajo: </a:t>
             </a:r>
           </a:p>
@@ -9332,7 +9335,12 @@
               </a:lnSpc>
             </a:pPr>
             <a:r>
-              <a:rPr lang="es-MX" altLang="es-MX" sz="1800" dirty="0"/>
+              <a:rPr lang="es-MX" altLang="es-MX" sz="1700" dirty="0">
+                <a:solidFill>
+                  <a:srgbClr val="888888"/>
+                </a:solidFill>
+                <a:latin typeface="Montserrat" panose="00000500000000000000" pitchFamily="2" charset="0"/>
+              </a:rPr>
               <a:t>Evaluación sistemática de algoritmos (clásicos vs. modernos) </a:t>
             </a:r>
           </a:p>
@@ -9343,16 +9351,13 @@
               </a:lnSpc>
             </a:pPr>
             <a:r>
-              <a:rPr lang="es-MX" altLang="es-MX" sz="1800" dirty="0"/>
-              <a:t>Aplicación en contextos reales (</a:t>
-            </a:r>
-            <a:r>
-              <a:rPr lang="es-MX" altLang="es-MX" sz="1800" dirty="0" err="1"/>
-              <a:t>e.g</a:t>
-            </a:r>
-            <a:r>
-              <a:rPr lang="es-MX" altLang="es-MX" sz="1800" dirty="0"/>
-              <a:t>., imágenes médicas, satelitales) </a:t>
+              <a:rPr lang="es-MX" altLang="es-MX" sz="1700" dirty="0">
+                <a:solidFill>
+                  <a:srgbClr val="888888"/>
+                </a:solidFill>
+                <a:latin typeface="Montserrat" panose="00000500000000000000" pitchFamily="2" charset="0"/>
+              </a:rPr>
+              <a:t>Aplicación en contextos reales (e.g., imágenes médicas, satelitales) </a:t>
             </a:r>
           </a:p>
           <a:p>
@@ -9362,7 +9367,12 @@
               </a:lnSpc>
             </a:pPr>
             <a:r>
-              <a:rPr lang="es-MX" altLang="es-MX" sz="1800" dirty="0"/>
+              <a:rPr lang="es-MX" altLang="es-MX" sz="1700" dirty="0">
+                <a:solidFill>
+                  <a:srgbClr val="888888"/>
+                </a:solidFill>
+                <a:latin typeface="Montserrat" panose="00000500000000000000" pitchFamily="2" charset="0"/>
+              </a:rPr>
               <a:t>Desarrollo de nuevos modelos o combinaciones de técnicas </a:t>
             </a:r>
           </a:p>
@@ -9373,7 +9383,12 @@
               </a:lnSpc>
             </a:pPr>
             <a:r>
-              <a:rPr lang="es-MX" altLang="es-MX" dirty="0"/>
+              <a:rPr lang="es-MX" altLang="es-MX" sz="1700" dirty="0">
+                <a:solidFill>
+                  <a:srgbClr val="888888"/>
+                </a:solidFill>
+                <a:latin typeface="Montserrat" panose="00000500000000000000" pitchFamily="2" charset="0"/>
+              </a:rPr>
               <a:t>Herramientas sugeridas: </a:t>
             </a:r>
           </a:p>
@@ -9384,48 +9399,13 @@
               </a:lnSpc>
             </a:pPr>
             <a:r>
-              <a:rPr lang="es-MX" altLang="es-MX" sz="1800" dirty="0"/>
-              <a:t>Python (</a:t>
-            </a:r>
-            <a:r>
-              <a:rPr lang="es-MX" altLang="es-MX" sz="1800" dirty="0" err="1"/>
-              <a:t>NumPy</a:t>
-            </a:r>
-            <a:r>
-              <a:rPr lang="es-MX" altLang="es-MX" sz="1800" dirty="0"/>
-              <a:t>, </a:t>
-            </a:r>
-            <a:r>
-              <a:rPr lang="es-MX" altLang="es-MX" sz="1800" dirty="0" err="1"/>
-              <a:t>Scikit-learn</a:t>
-            </a:r>
-            <a:r>
-              <a:rPr lang="es-MX" altLang="es-MX" sz="1800" dirty="0"/>
-              <a:t>, </a:t>
-            </a:r>
-            <a:r>
-              <a:rPr lang="es-MX" altLang="es-MX" sz="1800" dirty="0" err="1"/>
-              <a:t>TensorFlow</a:t>
-            </a:r>
-            <a:r>
-              <a:rPr lang="es-MX" altLang="es-MX" sz="1800" dirty="0"/>
-              <a:t>/</a:t>
-            </a:r>
-            <a:r>
-              <a:rPr lang="es-MX" altLang="es-MX" sz="1800" dirty="0" err="1"/>
-              <a:t>PyTorch</a:t>
-            </a:r>
-            <a:r>
-              <a:rPr lang="es-MX" altLang="es-MX" sz="1800" dirty="0"/>
-              <a:t>, </a:t>
-            </a:r>
-            <a:r>
-              <a:rPr lang="es-MX" altLang="es-MX" sz="1800" dirty="0" err="1"/>
-              <a:t>OpenCV</a:t>
-            </a:r>
-            <a:r>
-              <a:rPr lang="es-MX" altLang="es-MX" sz="1800" dirty="0"/>
-              <a:t>) </a:t>
+              <a:rPr lang="es-MX" altLang="es-MX" sz="1700" dirty="0">
+                <a:solidFill>
+                  <a:srgbClr val="888888"/>
+                </a:solidFill>
+                <a:latin typeface="Montserrat" panose="00000500000000000000" pitchFamily="2" charset="0"/>
+              </a:rPr>
+              <a:t>Python (NumPy, Scikit-learn, TensorFlow/PyTorch, OpenCV) </a:t>
             </a:r>
           </a:p>
           <a:p>
@@ -9435,7 +9415,12 @@
               </a:lnSpc>
             </a:pPr>
             <a:r>
-              <a:rPr lang="es-MX" altLang="es-MX" sz="1800" dirty="0"/>
+              <a:rPr lang="es-MX" altLang="es-MX" sz="1700" dirty="0">
+                <a:solidFill>
+                  <a:srgbClr val="888888"/>
+                </a:solidFill>
+                <a:latin typeface="Montserrat" panose="00000500000000000000" pitchFamily="2" charset="0"/>
+              </a:rPr>
               <a:t>Bases de datos públicas con imágenes corruptas o con máscaras simuladas</a:t>
             </a:r>
           </a:p>
@@ -9445,7 +9430,13 @@
                 <a:spcPct val="100000"/>
               </a:lnSpc>
             </a:pPr>
-            <a:endParaRPr lang="es-MX" altLang="es-MX" dirty="0"/>
+            <a:endParaRPr lang="es-MX" altLang="es-MX" sz="1700" dirty="0">
+              <a:solidFill>
+                <a:schemeClr val="bg2">
+                  <a:lumMod val="50000"/>
+                </a:schemeClr>
+              </a:solidFill>
+            </a:endParaRPr>
           </a:p>
         </p:txBody>
       </p:sp>

</xml_diff>